<commit_message>
BD impact figure and counts
</commit_message>
<xml_diff>
--- a/BCCAFigures-Laura-Feb192025.pptx
+++ b/BCCAFigures-Laura-Feb192025.pptx
@@ -10,6 +10,7 @@
     <p:sldId id="258" r:id="rId4"/>
     <p:sldId id="259" r:id="rId5"/>
     <p:sldId id="260" r:id="rId6"/>
+    <p:sldId id="262" r:id="rId7"/>
   </p:sldIdLst>
   <p:sldSz cx="12192000" cy="6858000"/>
   <p:notesSz cx="6858000" cy="9144000"/>
@@ -114,7 +115,7 @@
 <file path=ppt/revisionInfo.xml><?xml version="1.0" encoding="utf-8"?>
 <p1510:revInfo xmlns:a="http://schemas.openxmlformats.org/drawingml/2006/main" xmlns:r="http://schemas.openxmlformats.org/officeDocument/2006/relationships" xmlns:p1510="http://schemas.microsoft.com/office/powerpoint/2015/10/main">
   <p1510:revLst>
-    <p1510:client id="{93FC9A49-080B-5B44-BD75-9087AAFC4426}" v="2" dt="2025-02-20T00:27:47.904"/>
+    <p1510:client id="{93FC9A49-080B-5B44-BD75-9087AAFC4426}" v="5" dt="2025-02-20T18:15:27.302"/>
   </p1510:revLst>
 </p1510:revInfo>
 </file>
@@ -3775,7 +3776,7 @@
           <a:bodyPr/>
           <a:lstStyle/>
           <a:p>
-            <a:endParaRPr lang="en-US"/>
+            <a:endParaRPr lang="en-US" dirty="0"/>
           </a:p>
         </p:txBody>
       </p:sp>
@@ -3801,8 +3802,8 @@
         </p:blipFill>
         <p:spPr>
           <a:xfrm>
-            <a:off x="2209800" y="735828"/>
-            <a:ext cx="7772400" cy="5386344"/>
+            <a:off x="1242392" y="0"/>
+            <a:ext cx="9130588" cy="6327581"/>
           </a:xfrm>
           <a:prstGeom prst="rect">
             <a:avLst/>
@@ -3813,6 +3814,175 @@
     <p:extLst>
       <p:ext uri="{BB962C8B-B14F-4D97-AF65-F5344CB8AC3E}">
         <p14:creationId xmlns:p14="http://schemas.microsoft.com/office/powerpoint/2010/main" val="1759317748"/>
+      </p:ext>
+    </p:extLst>
+  </p:cSld>
+  <p:clrMapOvr>
+    <a:masterClrMapping/>
+  </p:clrMapOvr>
+</p:sld>
+</file>
+
+<file path=ppt/slides/slide6.xml><?xml version="1.0" encoding="utf-8"?>
+<p:sld xmlns:a="http://schemas.openxmlformats.org/drawingml/2006/main" xmlns:r="http://schemas.openxmlformats.org/officeDocument/2006/relationships" xmlns:p="http://schemas.openxmlformats.org/presentationml/2006/main">
+  <p:cSld>
+    <p:spTree>
+      <p:nvGrpSpPr>
+        <p:cNvPr id="1" name=""/>
+        <p:cNvGrpSpPr/>
+        <p:nvPr/>
+      </p:nvGrpSpPr>
+      <p:grpSpPr>
+        <a:xfrm>
+          <a:off x="0" y="0"/>
+          <a:ext cx="0" cy="0"/>
+          <a:chOff x="0" y="0"/>
+          <a:chExt cx="0" cy="0"/>
+        </a:xfrm>
+      </p:grpSpPr>
+      <p:sp>
+        <p:nvSpPr>
+          <p:cNvPr id="2" name="Title 1">
+            <a:extLst>
+              <a:ext uri="{FF2B5EF4-FFF2-40B4-BE49-F238E27FC236}">
+                <a16:creationId xmlns:a16="http://schemas.microsoft.com/office/drawing/2014/main" id="{B6C771A7-4152-F85D-EF59-3CA6BAA5613E}"/>
+              </a:ext>
+            </a:extLst>
+          </p:cNvPr>
+          <p:cNvSpPr>
+            <a:spLocks noGrp="1"/>
+          </p:cNvSpPr>
+          <p:nvPr>
+            <p:ph type="title"/>
+          </p:nvPr>
+        </p:nvSpPr>
+        <p:spPr/>
+        <p:txBody>
+          <a:bodyPr/>
+          <a:lstStyle/>
+          <a:p>
+            <a:endParaRPr lang="en-US"/>
+          </a:p>
+        </p:txBody>
+      </p:sp>
+      <p:sp>
+        <p:nvSpPr>
+          <p:cNvPr id="3" name="Content Placeholder 2">
+            <a:extLst>
+              <a:ext uri="{FF2B5EF4-FFF2-40B4-BE49-F238E27FC236}">
+                <a16:creationId xmlns:a16="http://schemas.microsoft.com/office/drawing/2014/main" id="{18B3273A-7A04-5E98-BE07-75603F837C8C}"/>
+              </a:ext>
+            </a:extLst>
+          </p:cNvPr>
+          <p:cNvSpPr>
+            <a:spLocks noGrp="1"/>
+          </p:cNvSpPr>
+          <p:nvPr>
+            <p:ph idx="1"/>
+          </p:nvPr>
+        </p:nvSpPr>
+        <p:spPr>
+          <a:xfrm>
+            <a:off x="-646043" y="3429000"/>
+            <a:ext cx="3800060" cy="4351338"/>
+          </a:xfrm>
+        </p:spPr>
+        <p:txBody>
+          <a:bodyPr/>
+          <a:lstStyle/>
+          <a:p>
+            <a:r>
+              <a:rPr lang="en-US" dirty="0"/>
+              <a:t>Increase is “good” – </a:t>
+            </a:r>
+          </a:p>
+          <a:p>
+            <a:pPr marL="0" indent="0">
+              <a:buNone/>
+            </a:pPr>
+            <a:endParaRPr lang="en-US" dirty="0"/>
+          </a:p>
+        </p:txBody>
+      </p:sp>
+      <p:sp>
+        <p:nvSpPr>
+          <p:cNvPr id="4" name="AutoShape 2">
+            <a:extLst>
+              <a:ext uri="{FF2B5EF4-FFF2-40B4-BE49-F238E27FC236}">
+                <a16:creationId xmlns:a16="http://schemas.microsoft.com/office/drawing/2014/main" id="{7C841437-A4E4-1A53-5338-B845A5E9109A}"/>
+              </a:ext>
+            </a:extLst>
+          </p:cNvPr>
+          <p:cNvSpPr>
+            <a:spLocks noChangeAspect="1" noChangeArrowheads="1"/>
+          </p:cNvSpPr>
+          <p:nvPr/>
+        </p:nvSpPr>
+        <p:spPr bwMode="auto">
+          <a:xfrm>
+            <a:off x="5943600" y="3276600"/>
+            <a:ext cx="304800" cy="304800"/>
+          </a:xfrm>
+          <a:prstGeom prst="rect">
+            <a:avLst/>
+          </a:prstGeom>
+          <a:noFill/>
+          <a:extLst>
+            <a:ext uri="{909E8E84-426E-40DD-AFC4-6F175D3DCCD1}">
+              <a14:hiddenFill xmlns:a14="http://schemas.microsoft.com/office/drawing/2010/main">
+                <a:solidFill>
+                  <a:srgbClr val="FFFFFF"/>
+                </a:solidFill>
+              </a14:hiddenFill>
+            </a:ext>
+          </a:extLst>
+        </p:spPr>
+        <p:txBody>
+          <a:bodyPr vert="horz" wrap="square" lIns="91440" tIns="45720" rIns="91440" bIns="45720" numCol="1" anchor="t" anchorCtr="0" compatLnSpc="1">
+            <a:prstTxWarp prst="textNoShape">
+              <a:avLst/>
+            </a:prstTxWarp>
+          </a:bodyPr>
+          <a:lstStyle/>
+          <a:p>
+            <a:endParaRPr lang="en-US"/>
+          </a:p>
+        </p:txBody>
+      </p:sp>
+      <p:pic>
+        <p:nvPicPr>
+          <p:cNvPr id="5" name="Picture 4">
+            <a:extLst>
+              <a:ext uri="{FF2B5EF4-FFF2-40B4-BE49-F238E27FC236}">
+                <a16:creationId xmlns:a16="http://schemas.microsoft.com/office/drawing/2014/main" id="{15E5023C-5513-44B2-7AF2-6862543187F5}"/>
+              </a:ext>
+            </a:extLst>
+          </p:cNvPr>
+          <p:cNvPicPr>
+            <a:picLocks noChangeAspect="1"/>
+          </p:cNvPicPr>
+          <p:nvPr/>
+        </p:nvPicPr>
+        <p:blipFill>
+          <a:blip r:embed="rId2"/>
+          <a:stretch>
+            <a:fillRect/>
+          </a:stretch>
+        </p:blipFill>
+        <p:spPr>
+          <a:xfrm>
+            <a:off x="2209800" y="619259"/>
+            <a:ext cx="7772400" cy="2809741"/>
+          </a:xfrm>
+          <a:prstGeom prst="rect">
+            <a:avLst/>
+          </a:prstGeom>
+        </p:spPr>
+      </p:pic>
+    </p:spTree>
+    <p:extLst>
+      <p:ext uri="{BB962C8B-B14F-4D97-AF65-F5344CB8AC3E}">
+        <p14:creationId xmlns:p14="http://schemas.microsoft.com/office/powerpoint/2010/main" val="253443835"/>
       </p:ext>
     </p:extLst>
   </p:cSld>

</xml_diff>

<commit_message>
create new code and figures for code
</commit_message>
<xml_diff>
--- a/BCCAFigures-Laura-Feb192025.pptx
+++ b/BCCAFigures-Laura-Feb192025.pptx
@@ -13,8 +13,10 @@
     <p:sldId id="262" r:id="rId7"/>
     <p:sldId id="265" r:id="rId8"/>
     <p:sldId id="263" r:id="rId9"/>
-    <p:sldId id="266" r:id="rId10"/>
-    <p:sldId id="264" r:id="rId11"/>
+    <p:sldId id="267" r:id="rId10"/>
+    <p:sldId id="266" r:id="rId11"/>
+    <p:sldId id="268" r:id="rId12"/>
+    <p:sldId id="264" r:id="rId13"/>
   </p:sldIdLst>
   <p:sldSz cx="12192000" cy="6858000"/>
   <p:notesSz cx="6858000" cy="9144000"/>
@@ -119,7 +121,7 @@
 <file path=ppt/revisionInfo.xml><?xml version="1.0" encoding="utf-8"?>
 <p1510:revInfo xmlns:a="http://schemas.openxmlformats.org/drawingml/2006/main" xmlns:r="http://schemas.openxmlformats.org/officeDocument/2006/relationships" xmlns:p1510="http://schemas.microsoft.com/office/powerpoint/2015/10/main">
   <p1510:revLst>
-    <p1510:client id="{93FC9A49-080B-5B44-BD75-9087AAFC4426}" v="8" dt="2025-02-21T00:23:50.614"/>
+    <p1510:client id="{93FC9A49-080B-5B44-BD75-9087AAFC4426}" v="13" dt="2025-02-21T23:29:52.503"/>
   </p1510:revLst>
 </p1510:revInfo>
 </file>
@@ -3432,6 +3434,201 @@
           <p:cNvPr id="2" name="Title 1">
             <a:extLst>
               <a:ext uri="{FF2B5EF4-FFF2-40B4-BE49-F238E27FC236}">
+                <a16:creationId xmlns:a16="http://schemas.microsoft.com/office/drawing/2014/main" id="{9E669531-B5D2-6299-47A4-EBDE61F349A7}"/>
+              </a:ext>
+            </a:extLst>
+          </p:cNvPr>
+          <p:cNvSpPr>
+            <a:spLocks noGrp="1"/>
+          </p:cNvSpPr>
+          <p:nvPr>
+            <p:ph type="title"/>
+          </p:nvPr>
+        </p:nvSpPr>
+        <p:spPr/>
+        <p:txBody>
+          <a:bodyPr/>
+          <a:lstStyle/>
+          <a:p>
+            <a:endParaRPr lang="en-US"/>
+          </a:p>
+        </p:txBody>
+      </p:sp>
+      <p:sp>
+        <p:nvSpPr>
+          <p:cNvPr id="3" name="Content Placeholder 2">
+            <a:extLst>
+              <a:ext uri="{FF2B5EF4-FFF2-40B4-BE49-F238E27FC236}">
+                <a16:creationId xmlns:a16="http://schemas.microsoft.com/office/drawing/2014/main" id="{6B17AEB0-0773-5579-B8E3-25301E7813BE}"/>
+              </a:ext>
+            </a:extLst>
+          </p:cNvPr>
+          <p:cNvSpPr>
+            <a:spLocks noGrp="1"/>
+          </p:cNvSpPr>
+          <p:nvPr>
+            <p:ph idx="1"/>
+          </p:nvPr>
+        </p:nvSpPr>
+        <p:spPr/>
+        <p:txBody>
+          <a:bodyPr/>
+          <a:lstStyle/>
+          <a:p>
+            <a:endParaRPr lang="en-US" dirty="0"/>
+          </a:p>
+        </p:txBody>
+      </p:sp>
+      <p:pic>
+        <p:nvPicPr>
+          <p:cNvPr id="5" name="Picture 4">
+            <a:extLst>
+              <a:ext uri="{FF2B5EF4-FFF2-40B4-BE49-F238E27FC236}">
+                <a16:creationId xmlns:a16="http://schemas.microsoft.com/office/drawing/2014/main" id="{0AE7C98F-1AB7-72B4-A15A-36C5D85BBC28}"/>
+              </a:ext>
+            </a:extLst>
+          </p:cNvPr>
+          <p:cNvPicPr>
+            <a:picLocks noChangeAspect="1"/>
+          </p:cNvPicPr>
+          <p:nvPr/>
+        </p:nvPicPr>
+        <p:blipFill>
+          <a:blip r:embed="rId2"/>
+          <a:stretch>
+            <a:fillRect/>
+          </a:stretch>
+        </p:blipFill>
+        <p:spPr>
+          <a:xfrm>
+            <a:off x="745190" y="574232"/>
+            <a:ext cx="10701620" cy="5602731"/>
+          </a:xfrm>
+          <a:prstGeom prst="rect">
+            <a:avLst/>
+          </a:prstGeom>
+        </p:spPr>
+      </p:pic>
+    </p:spTree>
+    <p:extLst>
+      <p:ext uri="{BB962C8B-B14F-4D97-AF65-F5344CB8AC3E}">
+        <p14:creationId xmlns:p14="http://schemas.microsoft.com/office/powerpoint/2010/main" val="647768699"/>
+      </p:ext>
+    </p:extLst>
+  </p:cSld>
+  <p:clrMapOvr>
+    <a:masterClrMapping/>
+  </p:clrMapOvr>
+</p:sld>
+</file>
+
+<file path=ppt/slides/slide11.xml><?xml version="1.0" encoding="utf-8"?>
+<p:sld xmlns:a="http://schemas.openxmlformats.org/drawingml/2006/main" xmlns:r="http://schemas.openxmlformats.org/officeDocument/2006/relationships" xmlns:p="http://schemas.openxmlformats.org/presentationml/2006/main">
+  <p:cSld>
+    <p:spTree>
+      <p:nvGrpSpPr>
+        <p:cNvPr id="1" name=""/>
+        <p:cNvGrpSpPr/>
+        <p:nvPr/>
+      </p:nvGrpSpPr>
+      <p:grpSpPr>
+        <a:xfrm>
+          <a:off x="0" y="0"/>
+          <a:ext cx="0" cy="0"/>
+          <a:chOff x="0" y="0"/>
+          <a:chExt cx="0" cy="0"/>
+        </a:xfrm>
+      </p:grpSpPr>
+      <p:sp>
+        <p:nvSpPr>
+          <p:cNvPr id="2" name="Title 1">
+            <a:extLst>
+              <a:ext uri="{FF2B5EF4-FFF2-40B4-BE49-F238E27FC236}">
+                <a16:creationId xmlns:a16="http://schemas.microsoft.com/office/drawing/2014/main" id="{A6480E8D-2D3C-9618-40C5-A74A9132F744}"/>
+              </a:ext>
+            </a:extLst>
+          </p:cNvPr>
+          <p:cNvSpPr>
+            <a:spLocks noGrp="1"/>
+          </p:cNvSpPr>
+          <p:nvPr>
+            <p:ph type="title"/>
+          </p:nvPr>
+        </p:nvSpPr>
+        <p:spPr/>
+        <p:txBody>
+          <a:bodyPr/>
+          <a:lstStyle/>
+          <a:p>
+            <a:endParaRPr lang="en-US"/>
+          </a:p>
+        </p:txBody>
+      </p:sp>
+      <p:pic>
+        <p:nvPicPr>
+          <p:cNvPr id="5" name="Picture 4">
+            <a:extLst>
+              <a:ext uri="{FF2B5EF4-FFF2-40B4-BE49-F238E27FC236}">
+                <a16:creationId xmlns:a16="http://schemas.microsoft.com/office/drawing/2014/main" id="{449E082A-5878-445B-B45C-583EC54436B4}"/>
+              </a:ext>
+            </a:extLst>
+          </p:cNvPr>
+          <p:cNvPicPr>
+            <a:picLocks noChangeAspect="1"/>
+          </p:cNvPicPr>
+          <p:nvPr/>
+        </p:nvPicPr>
+        <p:blipFill>
+          <a:blip r:embed="rId2"/>
+          <a:stretch>
+            <a:fillRect/>
+          </a:stretch>
+        </p:blipFill>
+        <p:spPr>
+          <a:xfrm>
+            <a:off x="367748" y="1430566"/>
+            <a:ext cx="7772400" cy="3731826"/>
+          </a:xfrm>
+          <a:prstGeom prst="rect">
+            <a:avLst/>
+          </a:prstGeom>
+        </p:spPr>
+      </p:pic>
+    </p:spTree>
+    <p:extLst>
+      <p:ext uri="{BB962C8B-B14F-4D97-AF65-F5344CB8AC3E}">
+        <p14:creationId xmlns:p14="http://schemas.microsoft.com/office/powerpoint/2010/main" val="3648584477"/>
+      </p:ext>
+    </p:extLst>
+  </p:cSld>
+  <p:clrMapOvr>
+    <a:masterClrMapping/>
+  </p:clrMapOvr>
+</p:sld>
+</file>
+
+<file path=ppt/slides/slide12.xml><?xml version="1.0" encoding="utf-8"?>
+<p:sld xmlns:a="http://schemas.openxmlformats.org/drawingml/2006/main" xmlns:r="http://schemas.openxmlformats.org/officeDocument/2006/relationships" xmlns:p="http://schemas.openxmlformats.org/presentationml/2006/main">
+  <p:cSld>
+    <p:spTree>
+      <p:nvGrpSpPr>
+        <p:cNvPr id="1" name=""/>
+        <p:cNvGrpSpPr/>
+        <p:nvPr/>
+      </p:nvGrpSpPr>
+      <p:grpSpPr>
+        <a:xfrm>
+          <a:off x="0" y="0"/>
+          <a:ext cx="0" cy="0"/>
+          <a:chOff x="0" y="0"/>
+          <a:chExt cx="0" cy="0"/>
+        </a:xfrm>
+      </p:grpSpPr>
+      <p:sp>
+        <p:nvSpPr>
+          <p:cNvPr id="2" name="Title 1">
+            <a:extLst>
+              <a:ext uri="{FF2B5EF4-FFF2-40B4-BE49-F238E27FC236}">
                 <a16:creationId xmlns:a16="http://schemas.microsoft.com/office/drawing/2014/main" id="{0549FACB-CB72-E76D-8414-9004F7667834}"/>
               </a:ext>
             </a:extLst>
@@ -4334,7 +4531,7 @@
           <p:cNvPr id="2" name="Title 1">
             <a:extLst>
               <a:ext uri="{FF2B5EF4-FFF2-40B4-BE49-F238E27FC236}">
-                <a16:creationId xmlns:a16="http://schemas.microsoft.com/office/drawing/2014/main" id="{9E669531-B5D2-6299-47A4-EBDE61F349A7}"/>
+                <a16:creationId xmlns:a16="http://schemas.microsoft.com/office/drawing/2014/main" id="{629553ED-F685-5356-CBD5-D7B493719F1C}"/>
               </a:ext>
             </a:extLst>
           </p:cNvPr>
@@ -4359,7 +4556,7 @@
           <p:cNvPr id="3" name="Content Placeholder 2">
             <a:extLst>
               <a:ext uri="{FF2B5EF4-FFF2-40B4-BE49-F238E27FC236}">
-                <a16:creationId xmlns:a16="http://schemas.microsoft.com/office/drawing/2014/main" id="{6B17AEB0-0773-5579-B8E3-25301E7813BE}"/>
+                <a16:creationId xmlns:a16="http://schemas.microsoft.com/office/drawing/2014/main" id="{45EF2E87-D214-0A53-DFB8-84C9490CCA53}"/>
               </a:ext>
             </a:extLst>
           </p:cNvPr>
@@ -4379,10 +4576,40 @@
           </a:p>
         </p:txBody>
       </p:sp>
+      <p:pic>
+        <p:nvPicPr>
+          <p:cNvPr id="4" name="Picture 3">
+            <a:extLst>
+              <a:ext uri="{FF2B5EF4-FFF2-40B4-BE49-F238E27FC236}">
+                <a16:creationId xmlns:a16="http://schemas.microsoft.com/office/drawing/2014/main" id="{BD00F778-5C6B-48C0-5E36-0E255AABA550}"/>
+              </a:ext>
+            </a:extLst>
+          </p:cNvPr>
+          <p:cNvPicPr>
+            <a:picLocks noChangeAspect="1"/>
+          </p:cNvPicPr>
+          <p:nvPr/>
+        </p:nvPicPr>
+        <p:blipFill>
+          <a:blip r:embed="rId2"/>
+          <a:stretch>
+            <a:fillRect/>
+          </a:stretch>
+        </p:blipFill>
+        <p:spPr>
+          <a:xfrm>
+            <a:off x="977347" y="917352"/>
+            <a:ext cx="7772400" cy="3565556"/>
+          </a:xfrm>
+          <a:prstGeom prst="rect">
+            <a:avLst/>
+          </a:prstGeom>
+        </p:spPr>
+      </p:pic>
     </p:spTree>
     <p:extLst>
       <p:ext uri="{BB962C8B-B14F-4D97-AF65-F5344CB8AC3E}">
-        <p14:creationId xmlns:p14="http://schemas.microsoft.com/office/powerpoint/2010/main" val="647768699"/>
+        <p14:creationId xmlns:p14="http://schemas.microsoft.com/office/powerpoint/2010/main" val="2183818648"/>
       </p:ext>
     </p:extLst>
   </p:cSld>

</xml_diff>